<commit_message>
Added ability to change window end date through argumennts in dbgetCohortData. Code cleanup.
</commit_message>
<xml_diff>
--- a/vignettes/PatientLevelPredictionFigures.pptx
+++ b/vignettes/PatientLevelPredictionFigures.pptx
@@ -288,7 +288,7 @@
           <a:p>
             <a:fld id="{2D4C718A-C667-4F05-B93E-BE32FA15ADD2}" type="datetimeFigureOut">
               <a:rPr lang="en-US" smtClean="0"/>
-              <a:t>3/31/2015</a:t>
+              <a:t>10/7/2015</a:t>
             </a:fld>
             <a:endParaRPr lang="en-US"/>
           </a:p>
@@ -458,7 +458,7 @@
           <a:p>
             <a:fld id="{2D4C718A-C667-4F05-B93E-BE32FA15ADD2}" type="datetimeFigureOut">
               <a:rPr lang="en-US" smtClean="0"/>
-              <a:t>3/31/2015</a:t>
+              <a:t>10/7/2015</a:t>
             </a:fld>
             <a:endParaRPr lang="en-US"/>
           </a:p>
@@ -638,7 +638,7 @@
           <a:p>
             <a:fld id="{2D4C718A-C667-4F05-B93E-BE32FA15ADD2}" type="datetimeFigureOut">
               <a:rPr lang="en-US" smtClean="0"/>
-              <a:t>3/31/2015</a:t>
+              <a:t>10/7/2015</a:t>
             </a:fld>
             <a:endParaRPr lang="en-US"/>
           </a:p>
@@ -808,7 +808,7 @@
           <a:p>
             <a:fld id="{2D4C718A-C667-4F05-B93E-BE32FA15ADD2}" type="datetimeFigureOut">
               <a:rPr lang="en-US" smtClean="0"/>
-              <a:t>3/31/2015</a:t>
+              <a:t>10/7/2015</a:t>
             </a:fld>
             <a:endParaRPr lang="en-US"/>
           </a:p>
@@ -1054,7 +1054,7 @@
           <a:p>
             <a:fld id="{2D4C718A-C667-4F05-B93E-BE32FA15ADD2}" type="datetimeFigureOut">
               <a:rPr lang="en-US" smtClean="0"/>
-              <a:t>3/31/2015</a:t>
+              <a:t>10/7/2015</a:t>
             </a:fld>
             <a:endParaRPr lang="en-US"/>
           </a:p>
@@ -1342,7 +1342,7 @@
           <a:p>
             <a:fld id="{2D4C718A-C667-4F05-B93E-BE32FA15ADD2}" type="datetimeFigureOut">
               <a:rPr lang="en-US" smtClean="0"/>
-              <a:t>3/31/2015</a:t>
+              <a:t>10/7/2015</a:t>
             </a:fld>
             <a:endParaRPr lang="en-US"/>
           </a:p>
@@ -1764,7 +1764,7 @@
           <a:p>
             <a:fld id="{2D4C718A-C667-4F05-B93E-BE32FA15ADD2}" type="datetimeFigureOut">
               <a:rPr lang="en-US" smtClean="0"/>
-              <a:t>3/31/2015</a:t>
+              <a:t>10/7/2015</a:t>
             </a:fld>
             <a:endParaRPr lang="en-US"/>
           </a:p>
@@ -1882,7 +1882,7 @@
           <a:p>
             <a:fld id="{2D4C718A-C667-4F05-B93E-BE32FA15ADD2}" type="datetimeFigureOut">
               <a:rPr lang="en-US" smtClean="0"/>
-              <a:t>3/31/2015</a:t>
+              <a:t>10/7/2015</a:t>
             </a:fld>
             <a:endParaRPr lang="en-US"/>
           </a:p>
@@ -1977,7 +1977,7 @@
           <a:p>
             <a:fld id="{2D4C718A-C667-4F05-B93E-BE32FA15ADD2}" type="datetimeFigureOut">
               <a:rPr lang="en-US" smtClean="0"/>
-              <a:t>3/31/2015</a:t>
+              <a:t>10/7/2015</a:t>
             </a:fld>
             <a:endParaRPr lang="en-US"/>
           </a:p>
@@ -2254,7 +2254,7 @@
           <a:p>
             <a:fld id="{2D4C718A-C667-4F05-B93E-BE32FA15ADD2}" type="datetimeFigureOut">
               <a:rPr lang="en-US" smtClean="0"/>
-              <a:t>3/31/2015</a:t>
+              <a:t>10/7/2015</a:t>
             </a:fld>
             <a:endParaRPr lang="en-US"/>
           </a:p>
@@ -2507,7 +2507,7 @@
           <a:p>
             <a:fld id="{2D4C718A-C667-4F05-B93E-BE32FA15ADD2}" type="datetimeFigureOut">
               <a:rPr lang="en-US" smtClean="0"/>
-              <a:t>3/31/2015</a:t>
+              <a:t>10/7/2015</a:t>
             </a:fld>
             <a:endParaRPr lang="en-US"/>
           </a:p>
@@ -2720,7 +2720,7 @@
           <a:p>
             <a:fld id="{2D4C718A-C667-4F05-B93E-BE32FA15ADD2}" type="datetimeFigureOut">
               <a:rPr lang="en-US" smtClean="0"/>
-              <a:t>3/31/2015</a:t>
+              <a:t>10/7/2015</a:t>
             </a:fld>
             <a:endParaRPr lang="en-US"/>
           </a:p>
@@ -3131,13 +3131,15 @@
       <p:cxnSp>
         <p:nvCxnSpPr>
           <p:cNvPr id="6" name="Straight Arrow Connector 5"/>
-          <p:cNvCxnSpPr/>
+          <p:cNvCxnSpPr>
+            <a:stCxn id="8" idx="2"/>
+          </p:cNvCxnSpPr>
           <p:nvPr/>
         </p:nvCxnSpPr>
         <p:spPr>
-          <a:xfrm>
-            <a:off x="4038600" y="1722550"/>
-            <a:ext cx="0" cy="533400"/>
+          <a:xfrm flipH="1">
+            <a:off x="4038600" y="1986030"/>
+            <a:ext cx="1" cy="269920"/>
           </a:xfrm>
           <a:prstGeom prst="straightConnector1">
             <a:avLst/>
@@ -3169,8 +3171,8 @@
         </p:nvSpPr>
         <p:spPr>
           <a:xfrm>
-            <a:off x="3097028" y="1383268"/>
-            <a:ext cx="1883144" cy="369332"/>
+            <a:off x="2692880" y="1339699"/>
+            <a:ext cx="2691442" cy="646331"/>
           </a:xfrm>
           <a:prstGeom prst="rect">
             <a:avLst/>
@@ -3186,7 +3188,14 @@
             <a:pPr algn="ctr"/>
             <a:r>
               <a:rPr lang="en-US" smtClean="0"/>
-              <a:t>cohort_start_date</a:t>
+              <a:t>Start of prediction window</a:t>
+            </a:r>
+          </a:p>
+          <a:p>
+            <a:pPr algn="ctr"/>
+            <a:r>
+              <a:rPr lang="en-US" smtClean="0"/>
+              <a:t>(cohort_start_date)</a:t>
             </a:r>
             <a:endParaRPr lang="en-US"/>
           </a:p>
@@ -3195,13 +3204,15 @@
       <p:cxnSp>
         <p:nvCxnSpPr>
           <p:cNvPr id="9" name="Straight Arrow Connector 8"/>
-          <p:cNvCxnSpPr/>
+          <p:cNvCxnSpPr>
+            <a:stCxn id="10" idx="2"/>
+          </p:cNvCxnSpPr>
           <p:nvPr/>
         </p:nvCxnSpPr>
         <p:spPr>
-          <a:xfrm>
-            <a:off x="6974647" y="1741936"/>
-            <a:ext cx="0" cy="533400"/>
+          <a:xfrm flipH="1">
+            <a:off x="6974647" y="1339699"/>
+            <a:ext cx="2" cy="935637"/>
           </a:xfrm>
           <a:prstGeom prst="straightConnector1">
             <a:avLst/>
@@ -3233,8 +3244,8 @@
         </p:nvSpPr>
         <p:spPr>
           <a:xfrm>
-            <a:off x="6068054" y="1383268"/>
-            <a:ext cx="1813189" cy="369332"/>
+            <a:off x="4921554" y="139370"/>
+            <a:ext cx="4106189" cy="1200329"/>
           </a:xfrm>
           <a:prstGeom prst="rect">
             <a:avLst/>
@@ -3250,7 +3261,28 @@
             <a:pPr algn="ctr"/>
             <a:r>
               <a:rPr lang="en-US" smtClean="0"/>
-              <a:t>cohort_end_date</a:t>
+              <a:t>End of prediction window</a:t>
+            </a:r>
+          </a:p>
+          <a:p>
+            <a:pPr algn="ctr"/>
+            <a:r>
+              <a:rPr lang="en-US" smtClean="0"/>
+              <a:t>(cohort_start_date + windowPersistence</a:t>
+            </a:r>
+          </a:p>
+          <a:p>
+            <a:pPr algn="ctr"/>
+            <a:r>
+              <a:rPr lang="en-US" smtClean="0"/>
+              <a:t>or</a:t>
+            </a:r>
+          </a:p>
+          <a:p>
+            <a:pPr algn="ctr"/>
+            <a:r>
+              <a:rPr lang="en-US" smtClean="0"/>
+              <a:t>cohort_end_date + windowPersistence)</a:t>
             </a:r>
             <a:endParaRPr lang="en-US"/>
           </a:p>
@@ -3440,13 +3472,15 @@
       <p:cxnSp>
         <p:nvCxnSpPr>
           <p:cNvPr id="16" name="Straight Arrow Connector 15"/>
-          <p:cNvCxnSpPr/>
+          <p:cNvCxnSpPr>
+            <a:stCxn id="17" idx="2"/>
+          </p:cNvCxnSpPr>
           <p:nvPr/>
         </p:nvCxnSpPr>
         <p:spPr>
           <a:xfrm>
-            <a:off x="1752601" y="1722550"/>
-            <a:ext cx="0" cy="533400"/>
+            <a:off x="1752601" y="1484531"/>
+            <a:ext cx="0" cy="771419"/>
           </a:xfrm>
           <a:prstGeom prst="straightConnector1">
             <a:avLst/>
@@ -3478,7 +3512,7 @@
         </p:nvSpPr>
         <p:spPr>
           <a:xfrm>
-            <a:off x="811029" y="1107342"/>
+            <a:off x="811029" y="838200"/>
             <a:ext cx="1883144" cy="646331"/>
           </a:xfrm>
           <a:prstGeom prst="rect">

</xml_diff>